<commit_message>
Deprecate ML Actions: remove balanced-view ML Actions UI, surface comments, update ML suggestions injection, clean CSS; add PPTX generator script
</commit_message>
<xml_diff>
--- a/output/SpeedyFlow.pptx
+++ b/output/SpeedyFlow.pptx
@@ -5090,9 +5090,30 @@
             </a:lnSpc>
           </a:pPr>
           <a:r>
-            <a:rPr lang="en-US"/>
-            <a:t>🔹 Cachés y hashing inteligente → renders ultrarrápidos</a:t>
+            <a:rPr lang="en-US" dirty="0"/>
+            <a:t>🔹 </a:t>
           </a:r>
+          <a:r>
+            <a:rPr lang="en-US" dirty="0" err="1"/>
+            <a:t>Cachés</a:t>
+          </a:r>
+          <a:r>
+            <a:rPr lang="en-US" dirty="0"/>
+            <a:t> y hashing </a:t>
+          </a:r>
+          <a:r>
+            <a:rPr lang="en-US" dirty="0" err="1"/>
+            <a:t>inteligente</a:t>
+          </a:r>
+          <a:r>
+            <a:rPr lang="en-US" dirty="0"/>
+            <a:t> → renders </a:t>
+          </a:r>
+          <a:r>
+            <a:rPr lang="en-US" dirty="0" err="1"/>
+            <a:t>ultrarrápidos</a:t>
+          </a:r>
+          <a:endParaRPr lang="en-US" dirty="0"/>
         </a:p>
       </dgm:t>
     </dgm:pt>
@@ -5434,7 +5455,7 @@
 <dgm:dataModel xmlns:dgm="http://schemas.openxmlformats.org/drawingml/2006/diagram" xmlns:a="http://schemas.openxmlformats.org/drawingml/2006/main">
   <dgm:ptLst>
     <dgm:pt modelId="{D67993DB-19B9-4882-8881-4677393013F8}" type="doc">
-      <dgm:prSet loTypeId="urn:microsoft.com/office/officeart/2005/8/layout/arrow5" loCatId="relationship" qsTypeId="urn:microsoft.com/office/officeart/2005/8/quickstyle/simple1" qsCatId="simple" csTypeId="urn:microsoft.com/office/officeart/2005/8/colors/accent1_2" csCatId="accent1"/>
+      <dgm:prSet loTypeId="urn:microsoft.com/office/officeart/2005/8/layout/arrow5" loCatId="relationship" qsTypeId="urn:microsoft.com/office/officeart/2005/8/quickstyle/simple1" qsCatId="simple" csTypeId="urn:microsoft.com/office/officeart/2005/8/colors/accent1_2" csCatId="accent1" phldr="1"/>
       <dgm:spPr/>
       <dgm:t>
         <a:bodyPr/>
@@ -5560,8 +5581,24 @@
         <a:lstStyle/>
         <a:p>
           <a:r>
-            <a:rPr lang="en-US"/>
-            <a:t>📈 Mejora en CSAT y cumplimiento de SLA</a:t>
+            <a:rPr lang="en-US" dirty="0"/>
+            <a:t>📈 Mejora </a:t>
+          </a:r>
+          <a:r>
+            <a:rPr lang="en-US" dirty="0" err="1"/>
+            <a:t>en</a:t>
+          </a:r>
+          <a:r>
+            <a:rPr lang="en-US" dirty="0"/>
+            <a:t> CSAT(Customer Satisfaction Score) y </a:t>
+          </a:r>
+          <a:r>
+            <a:rPr lang="en-US" dirty="0" err="1"/>
+            <a:t>cumplimiento</a:t>
+          </a:r>
+          <a:r>
+            <a:rPr lang="en-US" dirty="0"/>
+            <a:t> de SLA</a:t>
           </a:r>
         </a:p>
       </dgm:t>
@@ -5659,7 +5696,7 @@
 <dgm:dataModel xmlns:dgm="http://schemas.openxmlformats.org/drawingml/2006/diagram" xmlns:a="http://schemas.openxmlformats.org/drawingml/2006/main">
   <dgm:ptLst>
     <dgm:pt modelId="{ED3D5DB7-BE78-4E44-8766-63F2B5227F20}" type="doc">
-      <dgm:prSet loTypeId="urn:microsoft.com/office/officeart/2008/layout/LinedList" loCatId="list" qsTypeId="urn:microsoft.com/office/officeart/2005/8/quickstyle/simple1" qsCatId="simple" csTypeId="urn:microsoft.com/office/officeart/2005/8/colors/accent1_2" csCatId="accent1"/>
+      <dgm:prSet loTypeId="urn:microsoft.com/office/officeart/2008/layout/LinedList" loCatId="list" qsTypeId="urn:microsoft.com/office/officeart/2005/8/quickstyle/simple1" qsCatId="simple" csTypeId="urn:microsoft.com/office/officeart/2005/8/colors/accent1_2" csCatId="accent1" phldr="1"/>
       <dgm:spPr/>
       <dgm:t>
         <a:bodyPr/>
@@ -5677,8 +5714,32 @@
         <a:lstStyle/>
         <a:p>
           <a:r>
-            <a:rPr lang="en-US"/>
-            <a:t>🛠️ Triple capa de caching (sidebar, tablero, issue)</a:t>
+            <a:rPr lang="en-US" dirty="0"/>
+            <a:t>🛠️ Triple </a:t>
+          </a:r>
+          <a:r>
+            <a:rPr lang="en-US" dirty="0" err="1"/>
+            <a:t>capa</a:t>
+          </a:r>
+          <a:r>
+            <a:rPr lang="en-US" dirty="0"/>
+            <a:t> de caching (</a:t>
+          </a:r>
+          <a:r>
+            <a:rPr lang="en-US" dirty="0" err="1"/>
+            <a:t>LocalStorage</a:t>
+          </a:r>
+          <a:r>
+            <a:rPr lang="en-US" dirty="0"/>
+            <a:t>, SQLite, </a:t>
+          </a:r>
+          <a:r>
+            <a:rPr lang="en-US" dirty="0" err="1"/>
+            <a:t>BrowserCaché</a:t>
+          </a:r>
+          <a:r>
+            <a:rPr lang="en-US" dirty="0"/>
+            <a:t>)</a:t>
           </a:r>
         </a:p>
       </dgm:t>
@@ -5713,8 +5774,48 @@
         <a:lstStyle/>
         <a:p>
           <a:r>
-            <a:rPr lang="en-US"/>
-            <a:t>🛠️ FlowingContext: sugerencias contextuales en tiempo real</a:t>
+            <a:rPr lang="en-US" dirty="0"/>
+            <a:t>🛠️ </a:t>
+          </a:r>
+          <a:r>
+            <a:rPr lang="en-US" dirty="0" err="1"/>
+            <a:t>FlowingContext</a:t>
+          </a:r>
+          <a:r>
+            <a:rPr lang="en-US" dirty="0"/>
+            <a:t>: </a:t>
+          </a:r>
+          <a:r>
+            <a:rPr lang="en-US" dirty="0" err="1"/>
+            <a:t>sugerencias</a:t>
+          </a:r>
+          <a:r>
+            <a:rPr lang="en-US" dirty="0"/>
+            <a:t> </a:t>
+          </a:r>
+          <a:r>
+            <a:rPr lang="en-US" dirty="0" err="1"/>
+            <a:t>contextuales</a:t>
+          </a:r>
+          <a:r>
+            <a:rPr lang="en-US" dirty="0"/>
+            <a:t> </a:t>
+          </a:r>
+          <a:r>
+            <a:rPr lang="en-US" dirty="0" err="1"/>
+            <a:t>en</a:t>
+          </a:r>
+          <a:r>
+            <a:rPr lang="en-US" dirty="0"/>
+            <a:t> </a:t>
+          </a:r>
+          <a:r>
+            <a:rPr lang="en-US" dirty="0" err="1"/>
+            <a:t>tiempo</a:t>
+          </a:r>
+          <a:r>
+            <a:rPr lang="en-US" dirty="0"/>
+            <a:t> real</a:t>
           </a:r>
         </a:p>
       </dgm:t>
@@ -5749,8 +5850,32 @@
         <a:lstStyle/>
         <a:p>
           <a:r>
-            <a:rPr lang="en-US"/>
-            <a:t>🛠️ Hash-based rendering: re-render sólo si cambia el ticket</a:t>
+            <a:rPr lang="en-US" dirty="0"/>
+            <a:t>🛠️ Hash-based rendering: re-render </a:t>
+          </a:r>
+          <a:r>
+            <a:rPr lang="en-US" dirty="0" err="1"/>
+            <a:t>sólo</a:t>
+          </a:r>
+          <a:r>
+            <a:rPr lang="en-US" dirty="0"/>
+            <a:t> </a:t>
+          </a:r>
+          <a:r>
+            <a:rPr lang="en-US" dirty="0" err="1"/>
+            <a:t>si</a:t>
+          </a:r>
+          <a:r>
+            <a:rPr lang="en-US" dirty="0"/>
+            <a:t> cambia </a:t>
+          </a:r>
+          <a:r>
+            <a:rPr lang="en-US" dirty="0" err="1"/>
+            <a:t>el</a:t>
+          </a:r>
+          <a:r>
+            <a:rPr lang="en-US" dirty="0"/>
+            <a:t> ticket</a:t>
           </a:r>
         </a:p>
       </dgm:t>
@@ -5785,8 +5910,24 @@
         <a:lstStyle/>
         <a:p>
           <a:r>
-            <a:rPr lang="en-US"/>
-            <a:t>🛠️ Integraciones AI plug-and-play y privacidad local</a:t>
+            <a:rPr lang="en-US" dirty="0"/>
+            <a:t>🛠️ </a:t>
+          </a:r>
+          <a:r>
+            <a:rPr lang="en-US" dirty="0" err="1"/>
+            <a:t>Integraciones</a:t>
+          </a:r>
+          <a:r>
+            <a:rPr lang="en-US" dirty="0"/>
+            <a:t> AI plug-and-play y </a:t>
+          </a:r>
+          <a:r>
+            <a:rPr lang="en-US" dirty="0" err="1"/>
+            <a:t>privacidad</a:t>
+          </a:r>
+          <a:r>
+            <a:rPr lang="en-US" dirty="0"/>
+            <a:t> local</a:t>
           </a:r>
         </a:p>
       </dgm:t>
@@ -6051,8 +6192,24 @@
             </a:lnSpc>
           </a:pPr>
           <a:r>
-            <a:rPr lang="en-US"/>
-            <a:t>🔍 Piloto 4 semanas → Tiempo de resolución: -35%</a:t>
+            <a:rPr lang="en-US" dirty="0"/>
+            <a:t>🔍 Piloto 4 </a:t>
+          </a:r>
+          <a:r>
+            <a:rPr lang="en-US" dirty="0" err="1"/>
+            <a:t>semanas</a:t>
+          </a:r>
+          <a:r>
+            <a:rPr lang="en-US" dirty="0"/>
+            <a:t> → Tiempo de </a:t>
+          </a:r>
+          <a:r>
+            <a:rPr lang="en-US" dirty="0" err="1"/>
+            <a:t>resolución</a:t>
+          </a:r>
+          <a:r>
+            <a:rPr lang="en-US" dirty="0"/>
+            <a:t>: -35%</a:t>
           </a:r>
         </a:p>
       </dgm:t>
@@ -7309,9 +7466,30 @@
             <a:buNone/>
           </a:pPr>
           <a:r>
-            <a:rPr lang="en-US" sz="1400" kern="1200"/>
-            <a:t>🔹 Cachés y hashing inteligente → renders ultrarrápidos</a:t>
+            <a:rPr lang="en-US" sz="1400" kern="1200" dirty="0"/>
+            <a:t>🔹 </a:t>
           </a:r>
+          <a:r>
+            <a:rPr lang="en-US" sz="1400" kern="1200" dirty="0" err="1"/>
+            <a:t>Cachés</a:t>
+          </a:r>
+          <a:r>
+            <a:rPr lang="en-US" sz="1400" kern="1200" dirty="0"/>
+            <a:t> y hashing </a:t>
+          </a:r>
+          <a:r>
+            <a:rPr lang="en-US" sz="1400" kern="1200" dirty="0" err="1"/>
+            <a:t>inteligente</a:t>
+          </a:r>
+          <a:r>
+            <a:rPr lang="en-US" sz="1400" kern="1200" dirty="0"/>
+            <a:t> → renders </a:t>
+          </a:r>
+          <a:r>
+            <a:rPr lang="en-US" sz="1400" kern="1200" dirty="0" err="1"/>
+            <a:t>ultrarrápidos</a:t>
+          </a:r>
+          <a:endParaRPr lang="en-US" sz="1400" kern="1200" dirty="0"/>
         </a:p>
       </dsp:txBody>
       <dsp:txXfrm>
@@ -7873,8 +8051,24 @@
             <a:buNone/>
           </a:pPr>
           <a:r>
-            <a:rPr lang="en-US" sz="1000" kern="1200"/>
-            <a:t>📈 Mejora en CSAT y cumplimiento de SLA</a:t>
+            <a:rPr lang="en-US" sz="1000" kern="1200" dirty="0"/>
+            <a:t>📈 Mejora </a:t>
+          </a:r>
+          <a:r>
+            <a:rPr lang="en-US" sz="1000" kern="1200" dirty="0" err="1"/>
+            <a:t>en</a:t>
+          </a:r>
+          <a:r>
+            <a:rPr lang="en-US" sz="1000" kern="1200" dirty="0"/>
+            <a:t> CSAT(Customer Satisfaction Score) y </a:t>
+          </a:r>
+          <a:r>
+            <a:rPr lang="en-US" sz="1000" kern="1200" dirty="0" err="1"/>
+            <a:t>cumplimiento</a:t>
+          </a:r>
+          <a:r>
+            <a:rPr lang="en-US" sz="1000" kern="1200" dirty="0"/>
+            <a:t> de SLA</a:t>
           </a:r>
         </a:p>
       </dsp:txBody>
@@ -7976,12 +8170,12 @@
         <a:fontRef idx="minor"/>
       </dsp:style>
       <dsp:txBody>
-        <a:bodyPr spcFirstLastPara="0" vert="horz" wrap="square" lIns="95250" tIns="95250" rIns="95250" bIns="95250" numCol="1" spcCol="1270" anchor="t" anchorCtr="0">
+        <a:bodyPr spcFirstLastPara="0" vert="horz" wrap="square" lIns="91440" tIns="91440" rIns="91440" bIns="91440" numCol="1" spcCol="1270" anchor="t" anchorCtr="0">
           <a:noAutofit/>
         </a:bodyPr>
         <a:lstStyle/>
         <a:p>
-          <a:pPr marL="0" lvl="0" indent="0" algn="l" defTabSz="1111250">
+          <a:pPr marL="0" lvl="0" indent="0" algn="l" defTabSz="1066800">
             <a:lnSpc>
               <a:spcPct val="90000"/>
             </a:lnSpc>
@@ -7994,8 +8188,32 @@
             <a:buNone/>
           </a:pPr>
           <a:r>
-            <a:rPr lang="en-US" sz="2500" kern="1200"/>
-            <a:t>🛠️ Triple capa de caching (sidebar, tablero, issue)</a:t>
+            <a:rPr lang="en-US" sz="2400" kern="1200" dirty="0"/>
+            <a:t>🛠️ Triple </a:t>
+          </a:r>
+          <a:r>
+            <a:rPr lang="en-US" sz="2400" kern="1200" dirty="0" err="1"/>
+            <a:t>capa</a:t>
+          </a:r>
+          <a:r>
+            <a:rPr lang="en-US" sz="2400" kern="1200" dirty="0"/>
+            <a:t> de caching (</a:t>
+          </a:r>
+          <a:r>
+            <a:rPr lang="en-US" sz="2400" kern="1200" dirty="0" err="1"/>
+            <a:t>LocalStorage</a:t>
+          </a:r>
+          <a:r>
+            <a:rPr lang="en-US" sz="2400" kern="1200" dirty="0"/>
+            <a:t>, SQLite, </a:t>
+          </a:r>
+          <a:r>
+            <a:rPr lang="en-US" sz="2400" kern="1200" dirty="0" err="1"/>
+            <a:t>BrowserCaché</a:t>
+          </a:r>
+          <a:r>
+            <a:rPr lang="en-US" sz="2400" kern="1200" dirty="0"/>
+            <a:t>)</a:t>
           </a:r>
         </a:p>
       </dsp:txBody>
@@ -8085,12 +8303,12 @@
         <a:fontRef idx="minor"/>
       </dsp:style>
       <dsp:txBody>
-        <a:bodyPr spcFirstLastPara="0" vert="horz" wrap="square" lIns="95250" tIns="95250" rIns="95250" bIns="95250" numCol="1" spcCol="1270" anchor="t" anchorCtr="0">
+        <a:bodyPr spcFirstLastPara="0" vert="horz" wrap="square" lIns="91440" tIns="91440" rIns="91440" bIns="91440" numCol="1" spcCol="1270" anchor="t" anchorCtr="0">
           <a:noAutofit/>
         </a:bodyPr>
         <a:lstStyle/>
         <a:p>
-          <a:pPr marL="0" lvl="0" indent="0" algn="l" defTabSz="1111250">
+          <a:pPr marL="0" lvl="0" indent="0" algn="l" defTabSz="1066800">
             <a:lnSpc>
               <a:spcPct val="90000"/>
             </a:lnSpc>
@@ -8103,8 +8321,48 @@
             <a:buNone/>
           </a:pPr>
           <a:r>
-            <a:rPr lang="en-US" sz="2500" kern="1200"/>
-            <a:t>🛠️ FlowingContext: sugerencias contextuales en tiempo real</a:t>
+            <a:rPr lang="en-US" sz="2400" kern="1200" dirty="0"/>
+            <a:t>🛠️ </a:t>
+          </a:r>
+          <a:r>
+            <a:rPr lang="en-US" sz="2400" kern="1200" dirty="0" err="1"/>
+            <a:t>FlowingContext</a:t>
+          </a:r>
+          <a:r>
+            <a:rPr lang="en-US" sz="2400" kern="1200" dirty="0"/>
+            <a:t>: </a:t>
+          </a:r>
+          <a:r>
+            <a:rPr lang="en-US" sz="2400" kern="1200" dirty="0" err="1"/>
+            <a:t>sugerencias</a:t>
+          </a:r>
+          <a:r>
+            <a:rPr lang="en-US" sz="2400" kern="1200" dirty="0"/>
+            <a:t> </a:t>
+          </a:r>
+          <a:r>
+            <a:rPr lang="en-US" sz="2400" kern="1200" dirty="0" err="1"/>
+            <a:t>contextuales</a:t>
+          </a:r>
+          <a:r>
+            <a:rPr lang="en-US" sz="2400" kern="1200" dirty="0"/>
+            <a:t> </a:t>
+          </a:r>
+          <a:r>
+            <a:rPr lang="en-US" sz="2400" kern="1200" dirty="0" err="1"/>
+            <a:t>en</a:t>
+          </a:r>
+          <a:r>
+            <a:rPr lang="en-US" sz="2400" kern="1200" dirty="0"/>
+            <a:t> </a:t>
+          </a:r>
+          <a:r>
+            <a:rPr lang="en-US" sz="2400" kern="1200" dirty="0" err="1"/>
+            <a:t>tiempo</a:t>
+          </a:r>
+          <a:r>
+            <a:rPr lang="en-US" sz="2400" kern="1200" dirty="0"/>
+            <a:t> real</a:t>
           </a:r>
         </a:p>
       </dsp:txBody>
@@ -8194,12 +8452,12 @@
         <a:fontRef idx="minor"/>
       </dsp:style>
       <dsp:txBody>
-        <a:bodyPr spcFirstLastPara="0" vert="horz" wrap="square" lIns="95250" tIns="95250" rIns="95250" bIns="95250" numCol="1" spcCol="1270" anchor="t" anchorCtr="0">
+        <a:bodyPr spcFirstLastPara="0" vert="horz" wrap="square" lIns="91440" tIns="91440" rIns="91440" bIns="91440" numCol="1" spcCol="1270" anchor="t" anchorCtr="0">
           <a:noAutofit/>
         </a:bodyPr>
         <a:lstStyle/>
         <a:p>
-          <a:pPr marL="0" lvl="0" indent="0" algn="l" defTabSz="1111250">
+          <a:pPr marL="0" lvl="0" indent="0" algn="l" defTabSz="1066800">
             <a:lnSpc>
               <a:spcPct val="90000"/>
             </a:lnSpc>
@@ -8212,8 +8470,32 @@
             <a:buNone/>
           </a:pPr>
           <a:r>
-            <a:rPr lang="en-US" sz="2500" kern="1200"/>
-            <a:t>🛠️ Hash-based rendering: re-render sólo si cambia el ticket</a:t>
+            <a:rPr lang="en-US" sz="2400" kern="1200" dirty="0"/>
+            <a:t>🛠️ Hash-based rendering: re-render </a:t>
+          </a:r>
+          <a:r>
+            <a:rPr lang="en-US" sz="2400" kern="1200" dirty="0" err="1"/>
+            <a:t>sólo</a:t>
+          </a:r>
+          <a:r>
+            <a:rPr lang="en-US" sz="2400" kern="1200" dirty="0"/>
+            <a:t> </a:t>
+          </a:r>
+          <a:r>
+            <a:rPr lang="en-US" sz="2400" kern="1200" dirty="0" err="1"/>
+            <a:t>si</a:t>
+          </a:r>
+          <a:r>
+            <a:rPr lang="en-US" sz="2400" kern="1200" dirty="0"/>
+            <a:t> cambia </a:t>
+          </a:r>
+          <a:r>
+            <a:rPr lang="en-US" sz="2400" kern="1200" dirty="0" err="1"/>
+            <a:t>el</a:t>
+          </a:r>
+          <a:r>
+            <a:rPr lang="en-US" sz="2400" kern="1200" dirty="0"/>
+            <a:t> ticket</a:t>
           </a:r>
         </a:p>
       </dsp:txBody>
@@ -8303,12 +8585,12 @@
         <a:fontRef idx="minor"/>
       </dsp:style>
       <dsp:txBody>
-        <a:bodyPr spcFirstLastPara="0" vert="horz" wrap="square" lIns="95250" tIns="95250" rIns="95250" bIns="95250" numCol="1" spcCol="1270" anchor="t" anchorCtr="0">
+        <a:bodyPr spcFirstLastPara="0" vert="horz" wrap="square" lIns="91440" tIns="91440" rIns="91440" bIns="91440" numCol="1" spcCol="1270" anchor="t" anchorCtr="0">
           <a:noAutofit/>
         </a:bodyPr>
         <a:lstStyle/>
         <a:p>
-          <a:pPr marL="0" lvl="0" indent="0" algn="l" defTabSz="1111250">
+          <a:pPr marL="0" lvl="0" indent="0" algn="l" defTabSz="1066800">
             <a:lnSpc>
               <a:spcPct val="90000"/>
             </a:lnSpc>
@@ -8321,8 +8603,24 @@
             <a:buNone/>
           </a:pPr>
           <a:r>
-            <a:rPr lang="en-US" sz="2500" kern="1200"/>
-            <a:t>🛠️ Integraciones AI plug-and-play y privacidad local</a:t>
+            <a:rPr lang="en-US" sz="2400" kern="1200" dirty="0"/>
+            <a:t>🛠️ </a:t>
+          </a:r>
+          <a:r>
+            <a:rPr lang="en-US" sz="2400" kern="1200" dirty="0" err="1"/>
+            <a:t>Integraciones</a:t>
+          </a:r>
+          <a:r>
+            <a:rPr lang="en-US" sz="2400" kern="1200" dirty="0"/>
+            <a:t> AI plug-and-play y </a:t>
+          </a:r>
+          <a:r>
+            <a:rPr lang="en-US" sz="2400" kern="1200" dirty="0" err="1"/>
+            <a:t>privacidad</a:t>
+          </a:r>
+          <a:r>
+            <a:rPr lang="en-US" sz="2400" kern="1200" dirty="0"/>
+            <a:t> local</a:t>
           </a:r>
         </a:p>
       </dsp:txBody>
@@ -8412,12 +8710,12 @@
         <a:fontRef idx="minor"/>
       </dsp:style>
       <dsp:txBody>
-        <a:bodyPr spcFirstLastPara="0" vert="horz" wrap="square" lIns="95250" tIns="95250" rIns="95250" bIns="95250" numCol="1" spcCol="1270" anchor="t" anchorCtr="0">
+        <a:bodyPr spcFirstLastPara="0" vert="horz" wrap="square" lIns="91440" tIns="91440" rIns="91440" bIns="91440" numCol="1" spcCol="1270" anchor="t" anchorCtr="0">
           <a:noAutofit/>
         </a:bodyPr>
         <a:lstStyle/>
         <a:p>
-          <a:pPr marL="0" lvl="0" indent="0" algn="l" defTabSz="1111250">
+          <a:pPr marL="0" lvl="0" indent="0" algn="l" defTabSz="1066800">
             <a:lnSpc>
               <a:spcPct val="90000"/>
             </a:lnSpc>
@@ -8430,7 +8728,7 @@
             <a:buNone/>
           </a:pPr>
           <a:r>
-            <a:rPr lang="en-US" sz="2500" kern="1200"/>
+            <a:rPr lang="en-US" sz="2400" kern="1200"/>
             <a:t>🛠️ Kanban/Queue híbrido con reglas automáticas</a:t>
           </a:r>
         </a:p>
@@ -8674,8 +8972,24 @@
             <a:buNone/>
           </a:pPr>
           <a:r>
-            <a:rPr lang="en-US" sz="1400" kern="1200"/>
-            <a:t>🔍 Piloto 4 semanas → Tiempo de resolución: -35%</a:t>
+            <a:rPr lang="en-US" sz="1400" kern="1200" dirty="0"/>
+            <a:t>🔍 Piloto 4 </a:t>
+          </a:r>
+          <a:r>
+            <a:rPr lang="en-US" sz="1400" kern="1200" dirty="0" err="1"/>
+            <a:t>semanas</a:t>
+          </a:r>
+          <a:r>
+            <a:rPr lang="en-US" sz="1400" kern="1200" dirty="0"/>
+            <a:t> → Tiempo de </a:t>
+          </a:r>
+          <a:r>
+            <a:rPr lang="en-US" sz="1400" kern="1200" dirty="0" err="1"/>
+            <a:t>resolución</a:t>
+          </a:r>
+          <a:r>
+            <a:rPr lang="en-US" sz="1400" kern="1200" dirty="0"/>
+            <a:t>: -35%</a:t>
           </a:r>
         </a:p>
       </dsp:txBody>
@@ -17607,7 +17921,56 @@
           <a:lstStyle/>
           <a:p>
             <a:r>
-              <a:t>Breve explicación de cada feature; por qué es diferencial frente a Jira Web.</a:t>
+              <a:rPr dirty="0"/>
+              <a:t>Breve </a:t>
+            </a:r>
+            <a:r>
+              <a:rPr dirty="0" err="1"/>
+              <a:t>explicación</a:t>
+            </a:r>
+            <a:r>
+              <a:rPr dirty="0"/>
+              <a:t> de </a:t>
+            </a:r>
+            <a:r>
+              <a:rPr dirty="0" err="1"/>
+              <a:t>cada</a:t>
+            </a:r>
+            <a:r>
+              <a:rPr dirty="0"/>
+              <a:t> feature; </a:t>
+            </a:r>
+            <a:r>
+              <a:rPr dirty="0" err="1"/>
+              <a:t>por</a:t>
+            </a:r>
+            <a:r>
+              <a:rPr dirty="0"/>
+              <a:t> </a:t>
+            </a:r>
+            <a:r>
+              <a:rPr dirty="0" err="1"/>
+              <a:t>qué</a:t>
+            </a:r>
+            <a:r>
+              <a:rPr dirty="0"/>
+              <a:t> es </a:t>
+            </a:r>
+            <a:r>
+              <a:rPr dirty="0" err="1"/>
+              <a:t>diferencial</a:t>
+            </a:r>
+            <a:r>
+              <a:rPr dirty="0"/>
+              <a:t> </a:t>
+            </a:r>
+            <a:r>
+              <a:rPr dirty="0" err="1"/>
+              <a:t>frente</a:t>
+            </a:r>
+            <a:r>
+              <a:rPr dirty="0"/>
+              <a:t> a Jira Web.</a:t>
             </a:r>
           </a:p>
         </p:txBody>
@@ -17677,7 +18040,44 @@
           <a:lstStyle/>
           <a:p>
             <a:r>
-              <a:t>Proponer piloto controlado y KPIs (TTR, duplicados, CSAT, latencia).</a:t>
+              <a:rPr dirty="0" err="1"/>
+              <a:t>Proponer</a:t>
+            </a:r>
+            <a:r>
+              <a:rPr dirty="0"/>
+              <a:t> </a:t>
+            </a:r>
+            <a:r>
+              <a:rPr dirty="0" err="1"/>
+              <a:t>piloto</a:t>
+            </a:r>
+            <a:r>
+              <a:rPr dirty="0"/>
+              <a:t> </a:t>
+            </a:r>
+            <a:r>
+              <a:rPr dirty="0" err="1"/>
+              <a:t>controlado</a:t>
+            </a:r>
+            <a:r>
+              <a:rPr dirty="0"/>
+              <a:t> y KPIs (TTR, </a:t>
+            </a:r>
+            <a:r>
+              <a:rPr dirty="0" err="1"/>
+              <a:t>duplicados</a:t>
+            </a:r>
+            <a:r>
+              <a:rPr dirty="0"/>
+              <a:t>, CSAT, </a:t>
+            </a:r>
+            <a:r>
+              <a:rPr dirty="0" err="1"/>
+              <a:t>latencia</a:t>
+            </a:r>
+            <a:r>
+              <a:rPr dirty="0"/>
+              <a:t>).</a:t>
             </a:r>
           </a:p>
         </p:txBody>
@@ -17951,7 +18351,7 @@
           <a:p>
             <a:fld id="{5BCAD085-E8A6-8845-BD4E-CB4CCA059FC4}" type="datetimeFigureOut">
               <a:rPr lang="en-US" smtClean="0"/>
-              <a:t>12/15/2025</a:t>
+              <a:t>12/16/2025</a:t>
             </a:fld>
             <a:endParaRPr lang="en-US"/>
           </a:p>
@@ -18119,7 +18519,7 @@
           <a:p>
             <a:fld id="{5BCAD085-E8A6-8845-BD4E-CB4CCA059FC4}" type="datetimeFigureOut">
               <a:rPr lang="en-US" smtClean="0"/>
-              <a:t>12/15/2025</a:t>
+              <a:t>12/16/2025</a:t>
             </a:fld>
             <a:endParaRPr lang="en-US"/>
           </a:p>
@@ -18297,7 +18697,7 @@
           <a:p>
             <a:fld id="{5BCAD085-E8A6-8845-BD4E-CB4CCA059FC4}" type="datetimeFigureOut">
               <a:rPr lang="en-US" smtClean="0"/>
-              <a:t>12/15/2025</a:t>
+              <a:t>12/16/2025</a:t>
             </a:fld>
             <a:endParaRPr lang="en-US"/>
           </a:p>
@@ -18465,7 +18865,7 @@
           <a:p>
             <a:fld id="{5BCAD085-E8A6-8845-BD4E-CB4CCA059FC4}" type="datetimeFigureOut">
               <a:rPr lang="en-US" smtClean="0"/>
-              <a:t>12/15/2025</a:t>
+              <a:t>12/16/2025</a:t>
             </a:fld>
             <a:endParaRPr lang="en-US"/>
           </a:p>
@@ -18710,7 +19110,7 @@
           <a:p>
             <a:fld id="{5BCAD085-E8A6-8845-BD4E-CB4CCA059FC4}" type="datetimeFigureOut">
               <a:rPr lang="en-US" smtClean="0"/>
-              <a:t>12/15/2025</a:t>
+              <a:t>12/16/2025</a:t>
             </a:fld>
             <a:endParaRPr lang="en-US"/>
           </a:p>
@@ -18995,7 +19395,7 @@
           <a:p>
             <a:fld id="{5BCAD085-E8A6-8845-BD4E-CB4CCA059FC4}" type="datetimeFigureOut">
               <a:rPr lang="en-US" smtClean="0"/>
-              <a:t>12/15/2025</a:t>
+              <a:t>12/16/2025</a:t>
             </a:fld>
             <a:endParaRPr lang="en-US"/>
           </a:p>
@@ -19414,7 +19814,7 @@
           <a:p>
             <a:fld id="{5BCAD085-E8A6-8845-BD4E-CB4CCA059FC4}" type="datetimeFigureOut">
               <a:rPr lang="en-US" smtClean="0"/>
-              <a:t>12/15/2025</a:t>
+              <a:t>12/16/2025</a:t>
             </a:fld>
             <a:endParaRPr lang="en-US"/>
           </a:p>
@@ -19531,7 +19931,7 @@
           <a:p>
             <a:fld id="{5BCAD085-E8A6-8845-BD4E-CB4CCA059FC4}" type="datetimeFigureOut">
               <a:rPr lang="en-US" smtClean="0"/>
-              <a:t>12/15/2025</a:t>
+              <a:t>12/16/2025</a:t>
             </a:fld>
             <a:endParaRPr lang="en-US"/>
           </a:p>
@@ -19626,7 +20026,7 @@
           <a:p>
             <a:fld id="{5BCAD085-E8A6-8845-BD4E-CB4CCA059FC4}" type="datetimeFigureOut">
               <a:rPr lang="en-US" smtClean="0"/>
-              <a:t>12/15/2025</a:t>
+              <a:t>12/16/2025</a:t>
             </a:fld>
             <a:endParaRPr lang="en-US"/>
           </a:p>
@@ -19901,7 +20301,7 @@
           <a:p>
             <a:fld id="{5BCAD085-E8A6-8845-BD4E-CB4CCA059FC4}" type="datetimeFigureOut">
               <a:rPr lang="en-US" smtClean="0"/>
-              <a:t>12/15/2025</a:t>
+              <a:t>12/16/2025</a:t>
             </a:fld>
             <a:endParaRPr lang="en-US"/>
           </a:p>
@@ -20153,7 +20553,7 @@
           <a:p>
             <a:fld id="{5BCAD085-E8A6-8845-BD4E-CB4CCA059FC4}" type="datetimeFigureOut">
               <a:rPr lang="en-US" smtClean="0"/>
-              <a:t>12/15/2025</a:t>
+              <a:t>12/16/2025</a:t>
             </a:fld>
             <a:endParaRPr lang="en-US"/>
           </a:p>
@@ -20364,7 +20764,7 @@
           <a:p>
             <a:fld id="{5BCAD085-E8A6-8845-BD4E-CB4CCA059FC4}" type="datetimeFigureOut">
               <a:rPr lang="en-US" smtClean="0"/>
-              <a:t>12/15/2025</a:t>
+              <a:t>12/16/2025</a:t>
             </a:fld>
             <a:endParaRPr lang="en-US"/>
           </a:p>
@@ -22419,6 +22819,11 @@
           </p:cNvGraphicFramePr>
           <p:nvPr>
             <p:ph idx="1"/>
+            <p:extLst>
+              <p:ext uri="{D42A27DB-BD31-4B8C-83A1-F6EECF244321}">
+                <p14:modId xmlns:p14="http://schemas.microsoft.com/office/powerpoint/2010/main" val="3726029568"/>
+              </p:ext>
+            </p:extLst>
           </p:nvPr>
         </p:nvGraphicFramePr>
         <p:xfrm>
@@ -22550,6 +22955,11 @@
           </p:cNvGraphicFramePr>
           <p:nvPr>
             <p:ph idx="1"/>
+            <p:extLst>
+              <p:ext uri="{D42A27DB-BD31-4B8C-83A1-F6EECF244321}">
+                <p14:modId xmlns:p14="http://schemas.microsoft.com/office/powerpoint/2010/main" val="3154444299"/>
+              </p:ext>
+            </p:extLst>
           </p:nvPr>
         </p:nvGraphicFramePr>
         <p:xfrm>

</xml_diff>